<commit_message>
ctm v3 functional perm matrix
</commit_message>
<xml_diff>
--- a/docs/Drupal 7 CTM factory.pptx
+++ b/docs/Drupal 7 CTM factory.pptx
@@ -316,7 +316,7 @@
             <a:fld id="{47C9B81F-C347-4BEF-BFDF-29C42F48304A}" type="datetimeFigureOut">
               <a:rPr lang="en-US" smtClean="0"/>
               <a:pPr/>
-              <a:t>3/13/2017</a:t>
+              <a:t>3/21/2017</a:t>
             </a:fld>
             <a:endParaRPr lang="en-US"/>
           </a:p>
@@ -483,7 +483,7 @@
             <a:fld id="{47C9B81F-C347-4BEF-BFDF-29C42F48304A}" type="datetimeFigureOut">
               <a:rPr lang="en-US" smtClean="0"/>
               <a:pPr/>
-              <a:t>3/13/2017</a:t>
+              <a:t>3/21/2017</a:t>
             </a:fld>
             <a:endParaRPr lang="en-US"/>
           </a:p>
@@ -660,7 +660,7 @@
             <a:fld id="{47C9B81F-C347-4BEF-BFDF-29C42F48304A}" type="datetimeFigureOut">
               <a:rPr lang="en-US" smtClean="0"/>
               <a:pPr/>
-              <a:t>3/13/2017</a:t>
+              <a:t>3/21/2017</a:t>
             </a:fld>
             <a:endParaRPr lang="en-US"/>
           </a:p>
@@ -827,7 +827,7 @@
             <a:fld id="{47C9B81F-C347-4BEF-BFDF-29C42F48304A}" type="datetimeFigureOut">
               <a:rPr lang="en-US" smtClean="0"/>
               <a:pPr/>
-              <a:t>3/13/2017</a:t>
+              <a:t>3/21/2017</a:t>
             </a:fld>
             <a:endParaRPr lang="en-US"/>
           </a:p>
@@ -1065,7 +1065,7 @@
             <a:fld id="{47C9B81F-C347-4BEF-BFDF-29C42F48304A}" type="datetimeFigureOut">
               <a:rPr lang="en-US" smtClean="0"/>
               <a:pPr/>
-              <a:t>3/13/2017</a:t>
+              <a:t>3/21/2017</a:t>
             </a:fld>
             <a:endParaRPr lang="en-US"/>
           </a:p>
@@ -1331,7 +1331,7 @@
             <a:fld id="{47C9B81F-C347-4BEF-BFDF-29C42F48304A}" type="datetimeFigureOut">
               <a:rPr lang="en-US" smtClean="0"/>
               <a:pPr/>
-              <a:t>3/13/2017</a:t>
+              <a:t>3/21/2017</a:t>
             </a:fld>
             <a:endParaRPr lang="en-US"/>
           </a:p>
@@ -1711,7 +1711,7 @@
             <a:fld id="{47C9B81F-C347-4BEF-BFDF-29C42F48304A}" type="datetimeFigureOut">
               <a:rPr lang="en-US" smtClean="0"/>
               <a:pPr/>
-              <a:t>3/13/2017</a:t>
+              <a:t>3/21/2017</a:t>
             </a:fld>
             <a:endParaRPr lang="en-US"/>
           </a:p>
@@ -1863,7 +1863,7 @@
             <a:fld id="{47C9B81F-C347-4BEF-BFDF-29C42F48304A}" type="datetimeFigureOut">
               <a:rPr lang="en-US" smtClean="0"/>
               <a:pPr/>
-              <a:t>3/13/2017</a:t>
+              <a:t>3/21/2017</a:t>
             </a:fld>
             <a:endParaRPr lang="en-US"/>
           </a:p>
@@ -1955,7 +1955,7 @@
             <a:fld id="{47C9B81F-C347-4BEF-BFDF-29C42F48304A}" type="datetimeFigureOut">
               <a:rPr lang="en-US" smtClean="0"/>
               <a:pPr/>
-              <a:t>3/13/2017</a:t>
+              <a:t>3/21/2017</a:t>
             </a:fld>
             <a:endParaRPr lang="en-US"/>
           </a:p>
@@ -2218,7 +2218,7 @@
             <a:fld id="{47C9B81F-C347-4BEF-BFDF-29C42F48304A}" type="datetimeFigureOut">
               <a:rPr lang="en-US" smtClean="0"/>
               <a:pPr/>
-              <a:t>3/13/2017</a:t>
+              <a:t>3/21/2017</a:t>
             </a:fld>
             <a:endParaRPr lang="en-US"/>
           </a:p>
@@ -2508,7 +2508,7 @@
             <a:fld id="{47C9B81F-C347-4BEF-BFDF-29C42F48304A}" type="datetimeFigureOut">
               <a:rPr lang="en-US" smtClean="0"/>
               <a:pPr/>
-              <a:t>3/13/2017</a:t>
+              <a:t>3/21/2017</a:t>
             </a:fld>
             <a:endParaRPr lang="en-US"/>
           </a:p>
@@ -3277,7 +3277,7 @@
             <a:fld id="{47C9B81F-C347-4BEF-BFDF-29C42F48304A}" type="datetimeFigureOut">
               <a:rPr lang="en-US" smtClean="0"/>
               <a:pPr/>
-              <a:t>3/13/2017</a:t>
+              <a:t>3/21/2017</a:t>
             </a:fld>
             <a:endParaRPr lang="en-US" dirty="0">
               <a:solidFill>
@@ -3822,13 +3822,8 @@
           <a:p>
             <a:r>
               <a:rPr lang="fr-FR" dirty="0"/>
-              <a:t>Faucon V- 2017 - </a:t>
-            </a:r>
-            <a:r>
-              <a:rPr lang="fr-FR" dirty="0"/>
-              <a:t>https://github.com/fauconv/ctm_drupal7</a:t>
-            </a:r>
-            <a:endParaRPr lang="fr-FR" dirty="0"/>
+              <a:t>Faucon V- 2017 - https://github.com/fauconv/ctm_drupal7</a:t>
+            </a:r>
           </a:p>
         </p:txBody>
       </p:sp>
@@ -4559,25 +4554,6 @@
               <a:t> masquerade</a:t>
             </a:r>
           </a:p>
-          <a:p>
-            <a:pPr>
-              <a:lnSpc>
-                <a:spcPct val="150000"/>
-              </a:lnSpc>
-            </a:pPr>
-            <a:r>
-              <a:rPr lang="en-GB" sz="1800" dirty="0" err="1">
-                <a:latin typeface="+mj-lt"/>
-              </a:rPr>
-              <a:t>Ctm</a:t>
-            </a:r>
-            <a:r>
-              <a:rPr lang="en-GB" sz="1800" dirty="0">
-                <a:latin typeface="+mj-lt"/>
-              </a:rPr>
-              <a:t> mock</a:t>
-            </a:r>
-          </a:p>
         </p:txBody>
       </p:sp>
       <p:cxnSp>
@@ -5144,14 +5120,6 @@
               <a:rPr lang="en-GB" sz="1800" dirty="0">
                 <a:latin typeface="+mj-lt"/>
               </a:rPr>
-              <a:t>Maps suite</a:t>
-            </a:r>
-          </a:p>
-          <a:p>
-            <a:r>
-              <a:rPr lang="en-GB" sz="1800" dirty="0">
-                <a:latin typeface="+mj-lt"/>
-              </a:rPr>
               <a:t>Menu force</a:t>
             </a:r>
           </a:p>
@@ -5305,7 +5273,7 @@
         </p:spPr>
         <p:txBody>
           <a:bodyPr>
-            <a:normAutofit/>
+            <a:normAutofit lnSpcReduction="10000"/>
           </a:bodyPr>
           <a:lstStyle/>
           <a:p>
@@ -5391,7 +5359,7 @@
                 </a:solidFill>
                 <a:latin typeface="+mj-lt"/>
               </a:rPr>
-              <a:t>(TODO : documentation update) (2 days)</a:t>
+              <a:t>(TODO : documentation update)</a:t>
             </a:r>
           </a:p>
           <a:p>
@@ -5600,17 +5568,14 @@
                 </a:solidFill>
                 <a:latin typeface="+mj-lt"/>
               </a:rPr>
-              <a:t>TODO (0,5 day</a:t>
-            </a:r>
-            <a:r>
-              <a:rPr lang="en-GB" sz="1300" dirty="0">
-                <a:solidFill>
-                  <a:srgbClr val="FF0000"/>
-                </a:solidFill>
-                <a:latin typeface="+mj-lt"/>
-              </a:rPr>
-              <a:t>)</a:t>
-            </a:r>
+              <a:t>TODO </a:t>
+            </a:r>
+            <a:endParaRPr lang="en-GB" sz="1300" dirty="0">
+              <a:solidFill>
+                <a:srgbClr val="FF0000"/>
+              </a:solidFill>
+              <a:latin typeface="+mj-lt"/>
+            </a:endParaRPr>
           </a:p>
           <a:p>
             <a:pPr lvl="1">
@@ -5619,7 +5584,7 @@
               </a:lnSpc>
             </a:pPr>
             <a:r>
-              <a:rPr lang="en-GB" sz="1300" dirty="0">
+              <a:rPr lang="en-GB" sz="1200" dirty="0">
                 <a:solidFill>
                   <a:schemeClr val="tx1">
                     <a:lumMod val="95000"/>
@@ -5628,7 +5593,7 @@
                 </a:solidFill>
                 <a:latin typeface="+mj-lt"/>
               </a:rPr>
-              <a:t>New permission system base on matrix (view, comment, update, delete, create, publish, admin)</a:t>
+              <a:t>New permission system base on matrix, with the finest granularity ever (view, update, delete, create, publish, admin, create content type, update content type, delete content type) and fine granularity for field permission and user admin permission</a:t>
             </a:r>
           </a:p>
         </p:txBody>
@@ -8556,7 +8521,7 @@
                 <a:latin typeface="Courier New" panose="02070309020205020404" pitchFamily="49" charset="0"/>
                 <a:cs typeface="Courier New" panose="02070309020205020404" pitchFamily="49" charset="0"/>
               </a:rPr>
-              <a:t>edg_installation.api.inc :</a:t>
+              <a:t>ctm_installation.api.inc :</a:t>
             </a:r>
           </a:p>
           <a:p>
@@ -8568,7 +8533,7 @@
                 <a:latin typeface="Courier New" panose="02070309020205020404" pitchFamily="49" charset="0"/>
                 <a:cs typeface="Courier New" panose="02070309020205020404" pitchFamily="49" charset="0"/>
               </a:rPr>
-              <a:t>edg_installation_deleteDirectory</a:t>
+              <a:t>ctm_installation_deleteDirectory</a:t>
             </a:r>
             <a:r>
               <a:rPr lang="fr-FR" sz="1000" dirty="0">
@@ -8601,7 +8566,7 @@
                 <a:latin typeface="Courier New" panose="02070309020205020404" pitchFamily="49" charset="0"/>
                 <a:cs typeface="Courier New" panose="02070309020205020404" pitchFamily="49" charset="0"/>
               </a:rPr>
-              <a:t>edg_installation_debug</a:t>
+              <a:t>ctm_installation_debug</a:t>
             </a:r>
             <a:r>
               <a:rPr lang="fr-FR" sz="1000" dirty="0">
@@ -8620,7 +8585,7 @@
                 <a:latin typeface="Courier New" panose="02070309020205020404" pitchFamily="49" charset="0"/>
                 <a:cs typeface="Courier New" panose="02070309020205020404" pitchFamily="49" charset="0"/>
               </a:rPr>
-              <a:t>edg_installation_drupal_is_ajax</a:t>
+              <a:t>ctm_installation_drupal_is_ajax</a:t>
             </a:r>
             <a:r>
               <a:rPr lang="fr-FR" sz="1000" dirty="0">
@@ -8639,7 +8604,7 @@
                 <a:latin typeface="Courier New" panose="02070309020205020404" pitchFamily="49" charset="0"/>
                 <a:cs typeface="Courier New" panose="02070309020205020404" pitchFamily="49" charset="0"/>
               </a:rPr>
-              <a:t>edg_installation_menu_position_load_by_name</a:t>
+              <a:t>ctm_installation_menu_position_load_by_name</a:t>
             </a:r>
             <a:r>
               <a:rPr lang="fr-FR" sz="1000" dirty="0">
@@ -8672,7 +8637,7 @@
                 <a:latin typeface="Courier New" panose="02070309020205020404" pitchFamily="49" charset="0"/>
                 <a:cs typeface="Courier New" panose="02070309020205020404" pitchFamily="49" charset="0"/>
               </a:rPr>
-              <a:t>edg_installation_node_save</a:t>
+              <a:t>ctm_installation_node_save</a:t>
             </a:r>
             <a:r>
               <a:rPr lang="fr-FR" sz="1000" dirty="0">
@@ -8705,7 +8670,7 @@
                 <a:latin typeface="Courier New" panose="02070309020205020404" pitchFamily="49" charset="0"/>
                 <a:cs typeface="Courier New" panose="02070309020205020404" pitchFamily="49" charset="0"/>
               </a:rPr>
-              <a:t>edg_installation_insert_or_update_field</a:t>
+              <a:t>ctm_installation_insert_or_update_field</a:t>
             </a:r>
             <a:r>
               <a:rPr lang="fr-FR" sz="1000" dirty="0">
@@ -8738,7 +8703,7 @@
                 <a:latin typeface="Courier New" panose="02070309020205020404" pitchFamily="49" charset="0"/>
                 <a:cs typeface="Courier New" panose="02070309020205020404" pitchFamily="49" charset="0"/>
               </a:rPr>
-              <a:t>edg_installation_insert_or_update_field_instance</a:t>
+              <a:t>ctm_installation_insert_or_update_field_instance</a:t>
             </a:r>
             <a:r>
               <a:rPr lang="fr-FR" sz="1000" dirty="0">
@@ -8757,7 +8722,7 @@
                 <a:latin typeface="Courier New" panose="02070309020205020404" pitchFamily="49" charset="0"/>
                 <a:cs typeface="Courier New" panose="02070309020205020404" pitchFamily="49" charset="0"/>
               </a:rPr>
-              <a:t>edg_installation_insert_or_update</a:t>
+              <a:t>ctm_installation_insert_or_update</a:t>
             </a:r>
             <a:r>
               <a:rPr lang="fr-FR" sz="1000" dirty="0">
@@ -8776,7 +8741,7 @@
                 <a:latin typeface="Courier New" panose="02070309020205020404" pitchFamily="49" charset="0"/>
                 <a:cs typeface="Courier New" panose="02070309020205020404" pitchFamily="49" charset="0"/>
               </a:rPr>
-              <a:t>edg_installation_insert_or_update_blocs</a:t>
+              <a:t>ctm_installation_insert_or_update_blocs</a:t>
             </a:r>
             <a:r>
               <a:rPr lang="fr-FR" sz="1000" dirty="0">
@@ -8795,7 +8760,7 @@
                 <a:latin typeface="Courier New" panose="02070309020205020404" pitchFamily="49" charset="0"/>
                 <a:cs typeface="Courier New" panose="02070309020205020404" pitchFamily="49" charset="0"/>
               </a:rPr>
-              <a:t>edg_installation_menu_link_get</a:t>
+              <a:t>ctm_installation_menu_link_get</a:t>
             </a:r>
             <a:r>
               <a:rPr lang="fr-FR" sz="1000" dirty="0">
@@ -8838,51 +8803,51 @@
               <a:buNone/>
             </a:pPr>
             <a:r>
+              <a:rPr lang="en-US" sz="1000" dirty="0" err="1">
+                <a:latin typeface="Courier New" panose="02070309020205020404" pitchFamily="49" charset="0"/>
+                <a:cs typeface="Courier New" panose="02070309020205020404" pitchFamily="49" charset="0"/>
+              </a:rPr>
+              <a:t>theme_set_setting</a:t>
+            </a:r>
+            <a:r>
+              <a:rPr lang="en-US" sz="1000" dirty="0">
+                <a:latin typeface="Courier New" panose="02070309020205020404" pitchFamily="49" charset="0"/>
+                <a:cs typeface="Courier New" panose="02070309020205020404" pitchFamily="49" charset="0"/>
+              </a:rPr>
+              <a:t>($setting, $value, $theme = NULL)</a:t>
+            </a:r>
+          </a:p>
+          <a:p>
+            <a:pPr marL="0" indent="0">
+              <a:buNone/>
+            </a:pPr>
+            <a:r>
               <a:rPr lang="fr-FR" sz="1000" dirty="0" err="1">
                 <a:latin typeface="Courier New" panose="02070309020205020404" pitchFamily="49" charset="0"/>
                 <a:cs typeface="Courier New" panose="02070309020205020404" pitchFamily="49" charset="0"/>
               </a:rPr>
-              <a:t>edg_installation_add_bestmobile_icon</a:t>
+              <a:t>ctm_installation_user_roles</a:t>
             </a:r>
             <a:r>
               <a:rPr lang="fr-FR" sz="1000" dirty="0">
                 <a:latin typeface="Courier New" panose="02070309020205020404" pitchFamily="49" charset="0"/>
                 <a:cs typeface="Courier New" panose="02070309020205020404" pitchFamily="49" charset="0"/>
               </a:rPr>
-              <a:t>($type, $pattern, $</a:t>
+              <a:t>($</a:t>
             </a:r>
             <a:r>
               <a:rPr lang="fr-FR" sz="1000" dirty="0" err="1">
                 <a:latin typeface="Courier New" panose="02070309020205020404" pitchFamily="49" charset="0"/>
                 <a:cs typeface="Courier New" panose="02070309020205020404" pitchFamily="49" charset="0"/>
               </a:rPr>
-              <a:t>icon</a:t>
+              <a:t>clear</a:t>
             </a:r>
             <a:r>
               <a:rPr lang="fr-FR" sz="1000" dirty="0">
                 <a:latin typeface="Courier New" panose="02070309020205020404" pitchFamily="49" charset="0"/>
                 <a:cs typeface="Courier New" panose="02070309020205020404" pitchFamily="49" charset="0"/>
               </a:rPr>
-              <a:t>)</a:t>
-            </a:r>
-          </a:p>
-          <a:p>
-            <a:pPr marL="0" indent="0">
-              <a:buNone/>
-            </a:pPr>
-            <a:r>
-              <a:rPr lang="en-US" sz="1000" dirty="0" err="1">
-                <a:latin typeface="Courier New" panose="02070309020205020404" pitchFamily="49" charset="0"/>
-                <a:cs typeface="Courier New" panose="02070309020205020404" pitchFamily="49" charset="0"/>
-              </a:rPr>
-              <a:t>theme_set_setting</a:t>
-            </a:r>
-            <a:r>
-              <a:rPr lang="en-US" sz="1000" dirty="0">
-                <a:latin typeface="Courier New" panose="02070309020205020404" pitchFamily="49" charset="0"/>
-                <a:cs typeface="Courier New" panose="02070309020205020404" pitchFamily="49" charset="0"/>
-              </a:rPr>
-              <a:t>($setting, $value, $theme = NULL)</a:t>
+              <a:t> = FALSE)</a:t>
             </a:r>
           </a:p>
           <a:p>
@@ -8894,7 +8859,7 @@
                 <a:latin typeface="Courier New" panose="02070309020205020404" pitchFamily="49" charset="0"/>
                 <a:cs typeface="Courier New" panose="02070309020205020404" pitchFamily="49" charset="0"/>
               </a:rPr>
-              <a:t>edg_installation_user_roles</a:t>
+              <a:t>ctm_installation_add_ct_to_linkit</a:t>
             </a:r>
             <a:r>
               <a:rPr lang="fr-FR" sz="1000" dirty="0">
@@ -8908,14 +8873,14 @@
                 <a:latin typeface="Courier New" panose="02070309020205020404" pitchFamily="49" charset="0"/>
                 <a:cs typeface="Courier New" panose="02070309020205020404" pitchFamily="49" charset="0"/>
               </a:rPr>
-              <a:t>clear</a:t>
+              <a:t>ct_name</a:t>
             </a:r>
             <a:r>
               <a:rPr lang="fr-FR" sz="1000" dirty="0">
                 <a:latin typeface="Courier New" panose="02070309020205020404" pitchFamily="49" charset="0"/>
                 <a:cs typeface="Courier New" panose="02070309020205020404" pitchFamily="49" charset="0"/>
               </a:rPr>
-              <a:t> = FALSE)</a:t>
+              <a:t>)</a:t>
             </a:r>
           </a:p>
           <a:p>
@@ -8927,7 +8892,7 @@
                 <a:latin typeface="Courier New" panose="02070309020205020404" pitchFamily="49" charset="0"/>
                 <a:cs typeface="Courier New" panose="02070309020205020404" pitchFamily="49" charset="0"/>
               </a:rPr>
-              <a:t>edg_installation_add_ct_to_linkit</a:t>
+              <a:t>ctm_installation_deactivate_views</a:t>
             </a:r>
             <a:r>
               <a:rPr lang="fr-FR" sz="1000" dirty="0">
@@ -8941,7 +8906,7 @@
                 <a:latin typeface="Courier New" panose="02070309020205020404" pitchFamily="49" charset="0"/>
                 <a:cs typeface="Courier New" panose="02070309020205020404" pitchFamily="49" charset="0"/>
               </a:rPr>
-              <a:t>ct_name</a:t>
+              <a:t>view_list</a:t>
             </a:r>
             <a:r>
               <a:rPr lang="fr-FR" sz="1000" dirty="0">
@@ -8960,7 +8925,7 @@
                 <a:latin typeface="Courier New" panose="02070309020205020404" pitchFamily="49" charset="0"/>
                 <a:cs typeface="Courier New" panose="02070309020205020404" pitchFamily="49" charset="0"/>
               </a:rPr>
-              <a:t>edg_installation_deactivate_views</a:t>
+              <a:t>ctm_installation_activate_views</a:t>
             </a:r>
             <a:r>
               <a:rPr lang="fr-FR" sz="1000" dirty="0">
@@ -8993,28 +8958,28 @@
                 <a:latin typeface="Courier New" panose="02070309020205020404" pitchFamily="49" charset="0"/>
                 <a:cs typeface="Courier New" panose="02070309020205020404" pitchFamily="49" charset="0"/>
               </a:rPr>
-              <a:t>edg_installation_activate_views</a:t>
+              <a:t>ctm_installation_set_message</a:t>
             </a:r>
             <a:r>
               <a:rPr lang="fr-FR" sz="1000" dirty="0">
                 <a:latin typeface="Courier New" panose="02070309020205020404" pitchFamily="49" charset="0"/>
                 <a:cs typeface="Courier New" panose="02070309020205020404" pitchFamily="49" charset="0"/>
               </a:rPr>
-              <a:t>($</a:t>
+              <a:t>($id, $message = '', $</a:t>
             </a:r>
             <a:r>
               <a:rPr lang="fr-FR" sz="1000" dirty="0" err="1">
                 <a:latin typeface="Courier New" panose="02070309020205020404" pitchFamily="49" charset="0"/>
                 <a:cs typeface="Courier New" panose="02070309020205020404" pitchFamily="49" charset="0"/>
               </a:rPr>
-              <a:t>view_list</a:t>
+              <a:t>path</a:t>
             </a:r>
             <a:r>
               <a:rPr lang="fr-FR" sz="1000" dirty="0">
                 <a:latin typeface="Courier New" panose="02070309020205020404" pitchFamily="49" charset="0"/>
                 <a:cs typeface="Courier New" panose="02070309020205020404" pitchFamily="49" charset="0"/>
               </a:rPr>
-              <a:t>)</a:t>
+              <a:t> = '')</a:t>
             </a:r>
           </a:p>
           <a:p>
@@ -9026,238 +8991,64 @@
                 <a:latin typeface="Courier New" panose="02070309020205020404" pitchFamily="49" charset="0"/>
                 <a:cs typeface="Courier New" panose="02070309020205020404" pitchFamily="49" charset="0"/>
               </a:rPr>
-              <a:t>edg_installation_stack_in_array</a:t>
+              <a:t>ctm_installation_get_default_perms</a:t>
             </a:r>
             <a:r>
               <a:rPr lang="fr-FR" sz="1000" dirty="0">
                 <a:latin typeface="Courier New" panose="02070309020205020404" pitchFamily="49" charset="0"/>
                 <a:cs typeface="Courier New" panose="02070309020205020404" pitchFamily="49" charset="0"/>
               </a:rPr>
-              <a:t>(&amp;$</a:t>
-            </a:r>
+              <a:t>()</a:t>
+            </a:r>
+          </a:p>
+          <a:p>
+            <a:pPr marL="0" indent="0">
+              <a:buNone/>
+            </a:pPr>
             <a:r>
               <a:rPr lang="fr-FR" sz="1000" dirty="0" err="1">
                 <a:latin typeface="Courier New" panose="02070309020205020404" pitchFamily="49" charset="0"/>
                 <a:cs typeface="Courier New" panose="02070309020205020404" pitchFamily="49" charset="0"/>
               </a:rPr>
-              <a:t>pArray</a:t>
+              <a:t>ctm_installation_get_true_perms</a:t>
             </a:r>
             <a:r>
               <a:rPr lang="fr-FR" sz="1000" dirty="0">
                 <a:latin typeface="Courier New" panose="02070309020205020404" pitchFamily="49" charset="0"/>
                 <a:cs typeface="Courier New" panose="02070309020205020404" pitchFamily="49" charset="0"/>
               </a:rPr>
-              <a:t>, $</a:t>
-            </a:r>
+              <a:t>()</a:t>
+            </a:r>
+          </a:p>
+          <a:p>
+            <a:pPr marL="0" indent="0">
+              <a:buNone/>
+            </a:pPr>
             <a:r>
               <a:rPr lang="fr-FR" sz="1000" dirty="0" err="1">
                 <a:latin typeface="Courier New" panose="02070309020205020404" pitchFamily="49" charset="0"/>
                 <a:cs typeface="Courier New" panose="02070309020205020404" pitchFamily="49" charset="0"/>
               </a:rPr>
-              <a:t>keyAfter</a:t>
+              <a:t>ctm_installation_permission_matrice</a:t>
             </a:r>
             <a:r>
               <a:rPr lang="fr-FR" sz="1000" dirty="0">
                 <a:latin typeface="Courier New" panose="02070309020205020404" pitchFamily="49" charset="0"/>
                 <a:cs typeface="Courier New" panose="02070309020205020404" pitchFamily="49" charset="0"/>
               </a:rPr>
-              <a:t>, $</a:t>
-            </a:r>
+              <a:t>()</a:t>
+            </a:r>
+          </a:p>
+          <a:p>
+            <a:pPr marL="0" indent="0">
+              <a:buNone/>
+            </a:pPr>
             <a:r>
               <a:rPr lang="fr-FR" sz="1000" dirty="0" err="1">
                 <a:latin typeface="Courier New" panose="02070309020205020404" pitchFamily="49" charset="0"/>
                 <a:cs typeface="Courier New" panose="02070309020205020404" pitchFamily="49" charset="0"/>
               </a:rPr>
-              <a:t>keyAdd</a:t>
-            </a:r>
-            <a:r>
-              <a:rPr lang="fr-FR" sz="1000" dirty="0">
-                <a:latin typeface="Courier New" panose="02070309020205020404" pitchFamily="49" charset="0"/>
-                <a:cs typeface="Courier New" panose="02070309020205020404" pitchFamily="49" charset="0"/>
-              </a:rPr>
-              <a:t>, $</a:t>
-            </a:r>
-            <a:r>
-              <a:rPr lang="fr-FR" sz="1000" dirty="0" err="1">
-                <a:latin typeface="Courier New" panose="02070309020205020404" pitchFamily="49" charset="0"/>
-                <a:cs typeface="Courier New" panose="02070309020205020404" pitchFamily="49" charset="0"/>
-              </a:rPr>
-              <a:t>valueAdd</a:t>
-            </a:r>
-            <a:r>
-              <a:rPr lang="fr-FR" sz="1000" dirty="0">
-                <a:latin typeface="Courier New" panose="02070309020205020404" pitchFamily="49" charset="0"/>
-                <a:cs typeface="Courier New" panose="02070309020205020404" pitchFamily="49" charset="0"/>
-              </a:rPr>
-              <a:t>)</a:t>
-            </a:r>
-          </a:p>
-          <a:p>
-            <a:pPr marL="0" indent="0">
-              <a:buNone/>
-            </a:pPr>
-            <a:r>
-              <a:rPr lang="fr-FR" sz="1000" dirty="0" err="1">
-                <a:latin typeface="Courier New" panose="02070309020205020404" pitchFamily="49" charset="0"/>
-                <a:cs typeface="Courier New" panose="02070309020205020404" pitchFamily="49" charset="0"/>
-              </a:rPr>
-              <a:t>edg_installation_set_default_bloc_datas</a:t>
-            </a:r>
-            <a:r>
-              <a:rPr lang="fr-FR" sz="1000" dirty="0">
-                <a:latin typeface="Courier New" panose="02070309020205020404" pitchFamily="49" charset="0"/>
-                <a:cs typeface="Courier New" panose="02070309020205020404" pitchFamily="49" charset="0"/>
-              </a:rPr>
-              <a:t>($type, $</a:t>
-            </a:r>
-            <a:r>
-              <a:rPr lang="fr-FR" sz="1000" dirty="0" err="1">
-                <a:latin typeface="Courier New" panose="02070309020205020404" pitchFamily="49" charset="0"/>
-                <a:cs typeface="Courier New" panose="02070309020205020404" pitchFamily="49" charset="0"/>
-              </a:rPr>
-              <a:t>roles</a:t>
-            </a:r>
-            <a:r>
-              <a:rPr lang="fr-FR" sz="1000" dirty="0">
-                <a:latin typeface="Courier New" panose="02070309020205020404" pitchFamily="49" charset="0"/>
-                <a:cs typeface="Courier New" panose="02070309020205020404" pitchFamily="49" charset="0"/>
-              </a:rPr>
-              <a:t>, $profile)</a:t>
-            </a:r>
-          </a:p>
-          <a:p>
-            <a:pPr marL="0" indent="0">
-              <a:buNone/>
-            </a:pPr>
-            <a:r>
-              <a:rPr lang="fr-FR" sz="1000" dirty="0" err="1">
-                <a:latin typeface="Courier New" panose="02070309020205020404" pitchFamily="49" charset="0"/>
-                <a:cs typeface="Courier New" panose="02070309020205020404" pitchFamily="49" charset="0"/>
-              </a:rPr>
-              <a:t>edg_installation_set_default_content_type_datas</a:t>
-            </a:r>
-            <a:r>
-              <a:rPr lang="fr-FR" sz="1000" dirty="0">
-                <a:latin typeface="Courier New" panose="02070309020205020404" pitchFamily="49" charset="0"/>
-                <a:cs typeface="Courier New" panose="02070309020205020404" pitchFamily="49" charset="0"/>
-              </a:rPr>
-              <a:t>($type, $</a:t>
-            </a:r>
-            <a:r>
-              <a:rPr lang="fr-FR" sz="1000" dirty="0" err="1">
-                <a:latin typeface="Courier New" panose="02070309020205020404" pitchFamily="49" charset="0"/>
-                <a:cs typeface="Courier New" panose="02070309020205020404" pitchFamily="49" charset="0"/>
-              </a:rPr>
-              <a:t>roles</a:t>
-            </a:r>
-            <a:r>
-              <a:rPr lang="fr-FR" sz="1000" dirty="0">
-                <a:latin typeface="Courier New" panose="02070309020205020404" pitchFamily="49" charset="0"/>
-                <a:cs typeface="Courier New" panose="02070309020205020404" pitchFamily="49" charset="0"/>
-              </a:rPr>
-              <a:t>, $profile)</a:t>
-            </a:r>
-          </a:p>
-          <a:p>
-            <a:pPr marL="0" indent="0">
-              <a:buNone/>
-            </a:pPr>
-            <a:r>
-              <a:rPr lang="fr-FR" sz="1000" dirty="0" err="1">
-                <a:latin typeface="Courier New" panose="02070309020205020404" pitchFamily="49" charset="0"/>
-                <a:cs typeface="Courier New" panose="02070309020205020404" pitchFamily="49" charset="0"/>
-              </a:rPr>
-              <a:t>edg_installation_set_message</a:t>
-            </a:r>
-            <a:r>
-              <a:rPr lang="fr-FR" sz="1000" dirty="0">
-                <a:latin typeface="Courier New" panose="02070309020205020404" pitchFamily="49" charset="0"/>
-                <a:cs typeface="Courier New" panose="02070309020205020404" pitchFamily="49" charset="0"/>
-              </a:rPr>
-              <a:t>($id, $message = '', $</a:t>
-            </a:r>
-            <a:r>
-              <a:rPr lang="fr-FR" sz="1000" dirty="0" err="1">
-                <a:latin typeface="Courier New" panose="02070309020205020404" pitchFamily="49" charset="0"/>
-                <a:cs typeface="Courier New" panose="02070309020205020404" pitchFamily="49" charset="0"/>
-              </a:rPr>
-              <a:t>path</a:t>
-            </a:r>
-            <a:r>
-              <a:rPr lang="fr-FR" sz="1000" dirty="0">
-                <a:latin typeface="Courier New" panose="02070309020205020404" pitchFamily="49" charset="0"/>
-                <a:cs typeface="Courier New" panose="02070309020205020404" pitchFamily="49" charset="0"/>
-              </a:rPr>
-              <a:t> = '')</a:t>
-            </a:r>
-          </a:p>
-          <a:p>
-            <a:pPr marL="0" indent="0">
-              <a:buNone/>
-            </a:pPr>
-            <a:r>
-              <a:rPr lang="fr-FR" sz="1000" dirty="0" err="1">
-                <a:latin typeface="Courier New" panose="02070309020205020404" pitchFamily="49" charset="0"/>
-                <a:cs typeface="Courier New" panose="02070309020205020404" pitchFamily="49" charset="0"/>
-              </a:rPr>
-              <a:t>edg_installation_get_default_perms</a:t>
-            </a:r>
-            <a:r>
-              <a:rPr lang="fr-FR" sz="1000" dirty="0">
-                <a:latin typeface="Courier New" panose="02070309020205020404" pitchFamily="49" charset="0"/>
-                <a:cs typeface="Courier New" panose="02070309020205020404" pitchFamily="49" charset="0"/>
-              </a:rPr>
-              <a:t>()</a:t>
-            </a:r>
-          </a:p>
-          <a:p>
-            <a:pPr marL="0" indent="0">
-              <a:buNone/>
-            </a:pPr>
-            <a:r>
-              <a:rPr lang="fr-FR" sz="1000" dirty="0" err="1">
-                <a:latin typeface="Courier New" panose="02070309020205020404" pitchFamily="49" charset="0"/>
-                <a:cs typeface="Courier New" panose="02070309020205020404" pitchFamily="49" charset="0"/>
-              </a:rPr>
-              <a:t>edg_installation_get_true_perms</a:t>
-            </a:r>
-            <a:r>
-              <a:rPr lang="fr-FR" sz="1000" dirty="0">
-                <a:latin typeface="Courier New" panose="02070309020205020404" pitchFamily="49" charset="0"/>
-                <a:cs typeface="Courier New" panose="02070309020205020404" pitchFamily="49" charset="0"/>
-              </a:rPr>
-              <a:t>()</a:t>
-            </a:r>
-          </a:p>
-          <a:p>
-            <a:pPr marL="0" indent="0">
-              <a:buNone/>
-            </a:pPr>
-            <a:r>
-              <a:rPr lang="fr-FR" sz="1000" dirty="0" err="1">
-                <a:latin typeface="Courier New" panose="02070309020205020404" pitchFamily="49" charset="0"/>
-                <a:cs typeface="Courier New" panose="02070309020205020404" pitchFamily="49" charset="0"/>
-              </a:rPr>
-              <a:t>edg_installation_permission_matrice</a:t>
-            </a:r>
-            <a:r>
-              <a:rPr lang="fr-FR" sz="1000" dirty="0">
-                <a:latin typeface="Courier New" panose="02070309020205020404" pitchFamily="49" charset="0"/>
-                <a:cs typeface="Courier New" panose="02070309020205020404" pitchFamily="49" charset="0"/>
-              </a:rPr>
-              <a:t>()</a:t>
-            </a:r>
-          </a:p>
-          <a:p>
-            <a:pPr marL="0" indent="0">
-              <a:buNone/>
-            </a:pPr>
-            <a:r>
-              <a:rPr lang="fr-FR" sz="1000" dirty="0" err="1">
-                <a:latin typeface="Courier New" panose="02070309020205020404" pitchFamily="49" charset="0"/>
-                <a:cs typeface="Courier New" panose="02070309020205020404" pitchFamily="49" charset="0"/>
-              </a:rPr>
-              <a:t>edg_installation_set_permissions</a:t>
+              <a:t>ctm_installation_set_permissions</a:t>
             </a:r>
             <a:r>
               <a:rPr lang="fr-FR" sz="1000" dirty="0">
@@ -9456,11 +9247,11 @@
               <a:buNone/>
             </a:pPr>
             <a:r>
-              <a:rPr lang="fr-FR" sz="1000" b="1" dirty="0" err="1">
+              <a:rPr lang="fr-FR" sz="1000" b="1" dirty="0">
                 <a:latin typeface="Courier New" panose="02070309020205020404" pitchFamily="49" charset="0"/>
                 <a:cs typeface="Courier New" panose="02070309020205020404" pitchFamily="49" charset="0"/>
               </a:rPr>
-              <a:t>edg_installation.queue.inc</a:t>
+              <a:t>ctm_installation.queue.inc</a:t>
             </a:r>
             <a:endParaRPr lang="fr-CH" sz="1000" dirty="0">
               <a:latin typeface="Courier New" panose="02070309020205020404" pitchFamily="49" charset="0"/>
@@ -9492,7 +9283,7 @@
                 <a:latin typeface="Courier New" panose="02070309020205020404" pitchFamily="49" charset="0"/>
                 <a:cs typeface="Courier New" panose="02070309020205020404" pitchFamily="49" charset="0"/>
               </a:rPr>
-              <a:t>edg_installation_add_to_queue</a:t>
+              <a:t>ctm_installation_add_to_queue</a:t>
             </a:r>
             <a:r>
               <a:rPr lang="fr-CH" sz="1000" dirty="0">
@@ -9534,7 +9325,7 @@
                 <a:latin typeface="Courier New" panose="02070309020205020404" pitchFamily="49" charset="0"/>
                 <a:cs typeface="Courier New" panose="02070309020205020404" pitchFamily="49" charset="0"/>
               </a:rPr>
-              <a:t>edg_installation_check_no</a:t>
+              <a:t>ctm_installation_check_no</a:t>
             </a:r>
             <a:r>
               <a:rPr lang="fr-CH" sz="1000" dirty="0">
@@ -9553,7 +9344,7 @@
                 <a:latin typeface="Courier New" panose="02070309020205020404" pitchFamily="49" charset="0"/>
                 <a:cs typeface="Courier New" panose="02070309020205020404" pitchFamily="49" charset="0"/>
               </a:rPr>
-              <a:t>edg_installation_queue_message</a:t>
+              <a:t>ctm_installation_queue_message</a:t>
             </a:r>
             <a:r>
               <a:rPr lang="fr-CH" sz="1000" dirty="0">
@@ -9586,7 +9377,7 @@
                 <a:latin typeface="Courier New" panose="02070309020205020404" pitchFamily="49" charset="0"/>
                 <a:cs typeface="Courier New" panose="02070309020205020404" pitchFamily="49" charset="0"/>
               </a:rPr>
-              <a:t>edg_installation_queue_batch_end</a:t>
+              <a:t>ctm_installation_queue_batch_end</a:t>
             </a:r>
             <a:r>
               <a:rPr lang="fr-CH" sz="1000" dirty="0">
@@ -9640,7 +9431,7 @@
                 <a:latin typeface="Courier New" panose="02070309020205020404" pitchFamily="49" charset="0"/>
                 <a:cs typeface="Courier New" panose="02070309020205020404" pitchFamily="49" charset="0"/>
               </a:rPr>
-              <a:t>edg_installation_check_urls</a:t>
+              <a:t>ctm_installation_check_urls</a:t>
             </a:r>
             <a:r>
               <a:rPr lang="fr-CH" sz="1000" dirty="0">
@@ -9659,7 +9450,7 @@
                 <a:latin typeface="Courier New" panose="02070309020205020404" pitchFamily="49" charset="0"/>
                 <a:cs typeface="Courier New" panose="02070309020205020404" pitchFamily="49" charset="0"/>
               </a:rPr>
-              <a:t>edg_installation_check_no</a:t>
+              <a:t>ctm_installation_check_no</a:t>
             </a:r>
             <a:r>
               <a:rPr lang="fr-CH" sz="1000" dirty="0">
@@ -9699,7 +9490,7 @@
                 <a:latin typeface="Courier New" panose="02070309020205020404" pitchFamily="49" charset="0"/>
                 <a:cs typeface="Courier New" panose="02070309020205020404" pitchFamily="49" charset="0"/>
               </a:rPr>
-              <a:t>edg_installation_queue_add_clean_view_rules</a:t>
+              <a:t>ctm_installation_queue_add_clean_view_rules</a:t>
             </a:r>
             <a:r>
               <a:rPr lang="fr-CH" sz="1000" dirty="0">
@@ -9746,7 +9537,7 @@
                 <a:latin typeface="Courier New" panose="02070309020205020404" pitchFamily="49" charset="0"/>
                 <a:cs typeface="Courier New" panose="02070309020205020404" pitchFamily="49" charset="0"/>
               </a:rPr>
-              <a:t>edg_installation_queue_remove_rules</a:t>
+              <a:t>ctm_installation_queue_remove_rules</a:t>
             </a:r>
             <a:r>
               <a:rPr lang="fr-CH" sz="1000" dirty="0">
@@ -9779,7 +9570,7 @@
                 <a:latin typeface="Courier New" panose="02070309020205020404" pitchFamily="49" charset="0"/>
                 <a:cs typeface="Courier New" panose="02070309020205020404" pitchFamily="49" charset="0"/>
               </a:rPr>
-              <a:t>edg_installation_queue_module_disable</a:t>
+              <a:t>ctm_installation_queue_module_disable</a:t>
             </a:r>
             <a:r>
               <a:rPr lang="fr-CH" sz="1000" dirty="0">
@@ -9812,7 +9603,7 @@
                 <a:latin typeface="Courier New" panose="02070309020205020404" pitchFamily="49" charset="0"/>
                 <a:cs typeface="Courier New" panose="02070309020205020404" pitchFamily="49" charset="0"/>
               </a:rPr>
-              <a:t>edg_installation_queue_module_enable</a:t>
+              <a:t>ctm_installation_queue_module_enable</a:t>
             </a:r>
             <a:r>
               <a:rPr lang="fr-CH" sz="1000" dirty="0">
@@ -9831,7 +9622,7 @@
                 <a:latin typeface="Courier New" panose="02070309020205020404" pitchFamily="49" charset="0"/>
                 <a:cs typeface="Courier New" panose="02070309020205020404" pitchFamily="49" charset="0"/>
               </a:rPr>
-              <a:t>edg_installation_queue_menu_position_add_rule_ct</a:t>
+              <a:t>ctm_installation_queue_menu_position_add_rule_ct</a:t>
             </a:r>
             <a:r>
               <a:rPr lang="fr-CH" sz="1000" dirty="0">
@@ -9906,7 +9697,7 @@
                 <a:latin typeface="Courier New" panose="02070309020205020404" pitchFamily="49" charset="0"/>
                 <a:cs typeface="Courier New" panose="02070309020205020404" pitchFamily="49" charset="0"/>
               </a:rPr>
-              <a:t>edg_installation_queue_remove_menu_position_rule_ct</a:t>
+              <a:t>ctm_installation_queue_remove_menu_position_rule_ct</a:t>
             </a:r>
             <a:r>
               <a:rPr lang="fr-CH" sz="1000" dirty="0">
@@ -9939,7 +9730,7 @@
                 <a:latin typeface="Courier New" panose="02070309020205020404" pitchFamily="49" charset="0"/>
                 <a:cs typeface="Courier New" panose="02070309020205020404" pitchFamily="49" charset="0"/>
               </a:rPr>
-              <a:t>edg_installation_queue_menu_link_save</a:t>
+              <a:t>ctm_installation_queue_menu_link_save</a:t>
             </a:r>
             <a:r>
               <a:rPr lang="fr-CH" sz="1000" dirty="0">
@@ -9972,7 +9763,7 @@
                 <a:latin typeface="Courier New" panose="02070309020205020404" pitchFamily="49" charset="0"/>
                 <a:cs typeface="Courier New" panose="02070309020205020404" pitchFamily="49" charset="0"/>
               </a:rPr>
-              <a:t>edg_installation_queue_set_menu_parent</a:t>
+              <a:t>ctm_installation_queue_set_menu_parent</a:t>
             </a:r>
             <a:r>
               <a:rPr lang="fr-CH" sz="1000" dirty="0">
@@ -10019,7 +9810,7 @@
                 <a:latin typeface="Courier New" panose="02070309020205020404" pitchFamily="49" charset="0"/>
                 <a:cs typeface="Courier New" panose="02070309020205020404" pitchFamily="49" charset="0"/>
               </a:rPr>
-              <a:t>edg_installation_queue_cts_and_nodes_delete</a:t>
+              <a:t>ctm_installation_queue_cts_and_nodes_delete</a:t>
             </a:r>
             <a:r>
               <a:rPr lang="fr-CH" sz="1000" dirty="0">
@@ -10038,7 +9829,7 @@
                 <a:latin typeface="Courier New" panose="02070309020205020404" pitchFamily="49" charset="0"/>
                 <a:cs typeface="Courier New" panose="02070309020205020404" pitchFamily="49" charset="0"/>
               </a:rPr>
-              <a:t>edg_installation_queue_vocabulary_delete</a:t>
+              <a:t>ctm_installation_queue_vocabulary_delete</a:t>
             </a:r>
             <a:r>
               <a:rPr lang="fr-CH" sz="1000" dirty="0">
@@ -10071,7 +9862,7 @@
                 <a:latin typeface="Courier New" panose="02070309020205020404" pitchFamily="49" charset="0"/>
                 <a:cs typeface="Courier New" panose="02070309020205020404" pitchFamily="49" charset="0"/>
               </a:rPr>
-              <a:t>edg_installation_queue_insert_or_update_blocs</a:t>
+              <a:t>ctm_installation_queue_insert_or_update_blocs</a:t>
             </a:r>
             <a:r>
               <a:rPr lang="fr-CH" sz="1000" dirty="0">
@@ -10090,7 +9881,7 @@
                 <a:latin typeface="Courier New" panose="02070309020205020404" pitchFamily="49" charset="0"/>
                 <a:cs typeface="Courier New" panose="02070309020205020404" pitchFamily="49" charset="0"/>
               </a:rPr>
-              <a:t>edg_installation_queue_access_rebuild</a:t>
+              <a:t>ctm_installation_queue_access_rebuild</a:t>
             </a:r>
             <a:r>
               <a:rPr lang="fr-CH" sz="1000" dirty="0">
@@ -10127,12 +9918,16 @@
               <a:buNone/>
             </a:pPr>
             <a:r>
-              <a:rPr lang="fr-FR" sz="1000" b="1" dirty="0">
+              <a:rPr lang="fr-FR" sz="1000" b="1" dirty="0" err="1">
                 <a:latin typeface="Courier New" panose="02070309020205020404" pitchFamily="49" charset="0"/>
                 <a:cs typeface="Courier New" panose="02070309020205020404" pitchFamily="49" charset="0"/>
               </a:rPr>
-              <a:t>edg_installation.api.php</a:t>
-            </a:r>
+              <a:t>ctm_installation.api.php</a:t>
+            </a:r>
+            <a:endParaRPr lang="fr-FR" sz="1000" b="1" dirty="0">
+              <a:latin typeface="Courier New" panose="02070309020205020404" pitchFamily="49" charset="0"/>
+              <a:cs typeface="Courier New" panose="02070309020205020404" pitchFamily="49" charset="0"/>
+            </a:endParaRPr>
           </a:p>
           <a:p>
             <a:pPr marL="0" indent="0">
@@ -11316,662 +11111,360 @@
         </p:spPr>
         <p:txBody>
           <a:bodyPr>
-            <a:normAutofit fontScale="25000" lnSpcReduction="20000"/>
+            <a:normAutofit/>
           </a:bodyPr>
           <a:lstStyle/>
           <a:p>
-            <a:endParaRPr lang="en-US" sz="1400" dirty="0"/>
-          </a:p>
-          <a:p>
-            <a:pPr>
+            <a:pPr marL="0" indent="0">
               <a:buNone/>
             </a:pPr>
             <a:r>
-              <a:rPr lang="en-US" sz="3600" dirty="0">
-                <a:latin typeface="Courier New" pitchFamily="49" charset="0"/>
-                <a:cs typeface="Courier New" pitchFamily="49" charset="0"/>
+              <a:rPr lang="en-GB" sz="1000" dirty="0">
+                <a:latin typeface="Courier"/>
+              </a:rPr>
+              <a:t>CTM Manager  Version ctm_v2.0.0</a:t>
+            </a:r>
+          </a:p>
+          <a:p>
+            <a:pPr marL="0" indent="0">
+              <a:buNone/>
+            </a:pPr>
+            <a:endParaRPr lang="en-GB" sz="1000" dirty="0">
+              <a:latin typeface="Courier"/>
+            </a:endParaRPr>
+          </a:p>
+          <a:p>
+            <a:pPr marL="0" indent="0">
+              <a:buNone/>
+            </a:pPr>
+            <a:r>
+              <a:rPr lang="en-GB" sz="1000" dirty="0">
+                <a:latin typeface="Courier"/>
               </a:rPr>
               <a:t>= Usage :</a:t>
             </a:r>
           </a:p>
           <a:p>
-            <a:pPr>
+            <a:pPr marL="0" indent="0">
               <a:buNone/>
             </a:pPr>
             <a:r>
-              <a:rPr lang="en-US" sz="3600" dirty="0">
-                <a:latin typeface="Courier New" pitchFamily="49" charset="0"/>
-                <a:cs typeface="Courier New" pitchFamily="49" charset="0"/>
+              <a:rPr lang="en-GB" sz="1000" dirty="0">
+                <a:latin typeface="Courier"/>
               </a:rPr>
               <a:t>=========</a:t>
             </a:r>
           </a:p>
           <a:p>
-            <a:pPr>
+            <a:pPr marL="0" indent="0">
               <a:buNone/>
             </a:pPr>
             <a:r>
-              <a:rPr lang="en-US" sz="3600" dirty="0">
-                <a:latin typeface="Courier New" pitchFamily="49" charset="0"/>
-                <a:cs typeface="Courier New" pitchFamily="49" charset="0"/>
-              </a:rPr>
-              <a:t>deploy.sh &lt;options&gt; &lt;site-ref&gt;     --&gt; install or create a site (can by combined with -r and -p)</a:t>
-            </a:r>
-          </a:p>
-          <a:p>
-            <a:pPr>
+              <a:rPr lang="en-GB" sz="1000" dirty="0">
+                <a:latin typeface="Courier"/>
+              </a:rPr>
+              <a:t>  commands about the entire farm:</a:t>
+            </a:r>
+          </a:p>
+          <a:p>
+            <a:pPr marL="0" indent="0">
               <a:buNone/>
             </a:pPr>
             <a:r>
-              <a:rPr lang="en-US" sz="3600" dirty="0">
-                <a:latin typeface="Courier New" pitchFamily="49" charset="0"/>
-                <a:cs typeface="Courier New" pitchFamily="49" charset="0"/>
-              </a:rPr>
-              <a:t>deploy.sh -r &lt;site-ref&gt;            --&gt; remove installation of a site</a:t>
-            </a:r>
-          </a:p>
-          <a:p>
-            <a:pPr>
+              <a:rPr lang="en-GB" sz="1000" dirty="0">
+                <a:latin typeface="Courier"/>
+              </a:rPr>
+              <a:t>  -------------------------------</a:t>
+            </a:r>
+          </a:p>
+          <a:p>
+            <a:pPr marL="0" indent="0">
               <a:buNone/>
             </a:pPr>
-            <a:r>
-              <a:rPr lang="en-US" sz="3600" dirty="0">
-                <a:latin typeface="Courier New" pitchFamily="49" charset="0"/>
-                <a:cs typeface="Courier New" pitchFamily="49" charset="0"/>
-              </a:rPr>
-              <a:t>deploy.sh -p &lt;site-ref&gt;            --&gt; create a </a:t>
-            </a:r>
-            <a:r>
-              <a:rPr lang="en-US" sz="3600" dirty="0" err="1">
-                <a:latin typeface="Courier New" pitchFamily="49" charset="0"/>
-                <a:cs typeface="Courier New" pitchFamily="49" charset="0"/>
-              </a:rPr>
-              <a:t>dumpfile</a:t>
-            </a:r>
-            <a:r>
-              <a:rPr lang="en-US" sz="3600" dirty="0">
-                <a:latin typeface="Courier New" pitchFamily="49" charset="0"/>
-                <a:cs typeface="Courier New" pitchFamily="49" charset="0"/>
-              </a:rPr>
-              <a:t> of the database corresponding to the site-ref</a:t>
-            </a:r>
-          </a:p>
-          <a:p>
-            <a:pPr>
+            <a:endParaRPr lang="en-GB" sz="1000" dirty="0">
+              <a:latin typeface="Courier"/>
+            </a:endParaRPr>
+          </a:p>
+          <a:p>
+            <a:pPr marL="0" indent="0">
               <a:buNone/>
             </a:pPr>
             <a:r>
-              <a:rPr lang="en-US" sz="3600" dirty="0">
-                <a:latin typeface="Courier New" pitchFamily="49" charset="0"/>
-                <a:cs typeface="Courier New" pitchFamily="49" charset="0"/>
-              </a:rPr>
-              <a:t>deploy.sh -u                       --&gt; update all installed site</a:t>
-            </a:r>
-          </a:p>
-          <a:p>
-            <a:pPr>
+              <a:rPr lang="en-GB" sz="1000" dirty="0">
+                <a:latin typeface="Courier"/>
+              </a:rPr>
+              <a:t>  project.sh package &lt;version&gt; : create a package for deployment in production of a project</a:t>
+            </a:r>
+          </a:p>
+          <a:p>
+            <a:pPr marL="0" indent="0">
               <a:buNone/>
             </a:pPr>
             <a:r>
-              <a:rPr lang="en-US" sz="3600" dirty="0">
-                <a:latin typeface="Courier New" pitchFamily="49" charset="0"/>
-                <a:cs typeface="Courier New" pitchFamily="49" charset="0"/>
-              </a:rPr>
-              <a:t>deploy.sh -z &lt;</a:t>
-            </a:r>
-            <a:r>
-              <a:rPr lang="en-US" sz="3600" dirty="0" err="1">
-                <a:latin typeface="Courier New" pitchFamily="49" charset="0"/>
-                <a:cs typeface="Courier New" pitchFamily="49" charset="0"/>
-              </a:rPr>
-              <a:t>tgz</a:t>
-            </a:r>
-            <a:r>
-              <a:rPr lang="en-US" sz="3600" dirty="0">
-                <a:latin typeface="Courier New" pitchFamily="49" charset="0"/>
-                <a:cs typeface="Courier New" pitchFamily="49" charset="0"/>
-              </a:rPr>
-              <a:t>-file&gt;            --&gt; update a drupal farm with the zip-file provided by package.sh</a:t>
-            </a:r>
-          </a:p>
-          <a:p>
-            <a:pPr>
+              <a:rPr lang="en-GB" sz="1000" dirty="0">
+                <a:latin typeface="Courier"/>
+              </a:rPr>
+              <a:t>  project.sh unpack &lt;file&gt;     :</a:t>
+            </a:r>
+          </a:p>
+          <a:p>
+            <a:pPr marL="0" indent="0">
               <a:buNone/>
             </a:pPr>
             <a:r>
-              <a:rPr lang="en-US" sz="3600" dirty="0">
-                <a:latin typeface="Courier New" pitchFamily="49" charset="0"/>
-                <a:cs typeface="Courier New" pitchFamily="49" charset="0"/>
-              </a:rPr>
-              <a:t>deploy.sh -l                       --&gt; print list of all site present in this distribution</a:t>
-            </a:r>
-          </a:p>
-          <a:p>
-            <a:pPr>
+              <a:rPr lang="en-GB" sz="1000" dirty="0">
+                <a:latin typeface="Courier"/>
+              </a:rPr>
+              <a:t>  project.sh list              : list all web-site (site-id) in this project</a:t>
+            </a:r>
+          </a:p>
+          <a:p>
+            <a:pPr marL="0" indent="0">
               <a:buNone/>
             </a:pPr>
-            <a:endParaRPr lang="en-US" sz="3600" dirty="0">
-              <a:latin typeface="Courier New" pitchFamily="49" charset="0"/>
-              <a:cs typeface="Courier New" pitchFamily="49" charset="0"/>
+            <a:r>
+              <a:rPr lang="en-GB" sz="1000" dirty="0">
+                <a:latin typeface="Courier"/>
+              </a:rPr>
+              <a:t>  project.sh update            : update and rebuild all web-site in production or dev</a:t>
+            </a:r>
+          </a:p>
+          <a:p>
+            <a:pPr marL="0" indent="0">
+              <a:buNone/>
+            </a:pPr>
+            <a:r>
+              <a:rPr lang="en-GB" sz="1000" dirty="0">
+                <a:latin typeface="Courier"/>
+              </a:rPr>
+              <a:t>  project.sh set (</a:t>
+            </a:r>
+            <a:r>
+              <a:rPr lang="en-GB" sz="1000" dirty="0" err="1">
+                <a:latin typeface="Courier"/>
+              </a:rPr>
+              <a:t>dev|prod</a:t>
+            </a:r>
+            <a:r>
+              <a:rPr lang="en-GB" sz="1000" dirty="0">
+                <a:latin typeface="Courier"/>
+              </a:rPr>
+              <a:t>)    : the file right protection. dev =&gt; all file writable</a:t>
+            </a:r>
+          </a:p>
+          <a:p>
+            <a:pPr marL="0" indent="0">
+              <a:buNone/>
+            </a:pPr>
+            <a:endParaRPr lang="en-GB" sz="1000" dirty="0">
+              <a:latin typeface="Courier"/>
             </a:endParaRPr>
           </a:p>
           <a:p>
-            <a:pPr>
+            <a:pPr marL="0" indent="0">
               <a:buNone/>
             </a:pPr>
-            <a:endParaRPr lang="en-US" sz="3600" dirty="0">
-              <a:latin typeface="Courier New" pitchFamily="49" charset="0"/>
-              <a:cs typeface="Courier New" pitchFamily="49" charset="0"/>
+            <a:r>
+              <a:rPr lang="en-GB" sz="1000" dirty="0">
+                <a:latin typeface="Courier"/>
+              </a:rPr>
+              <a:t>  commands about a site of the farm:</a:t>
+            </a:r>
+          </a:p>
+          <a:p>
+            <a:pPr marL="0" indent="0">
+              <a:buNone/>
+            </a:pPr>
+            <a:r>
+              <a:rPr lang="en-GB" sz="1000" dirty="0">
+                <a:latin typeface="Courier"/>
+              </a:rPr>
+              <a:t>  ----------------------------------</a:t>
+            </a:r>
+          </a:p>
+          <a:p>
+            <a:pPr marL="0" indent="0">
+              <a:buNone/>
+            </a:pPr>
+            <a:endParaRPr lang="en-GB" sz="1000" dirty="0">
+              <a:latin typeface="Courier"/>
             </a:endParaRPr>
           </a:p>
           <a:p>
-            <a:pPr>
+            <a:pPr marL="0" indent="0">
               <a:buNone/>
             </a:pPr>
             <a:r>
-              <a:rPr lang="en-US" sz="3600" dirty="0">
-                <a:latin typeface="Courier New" pitchFamily="49" charset="0"/>
-                <a:cs typeface="Courier New" pitchFamily="49" charset="0"/>
-              </a:rPr>
-              <a:t>= Installation and creation options :</a:t>
-            </a:r>
-          </a:p>
-          <a:p>
-            <a:pPr>
+              <a:rPr lang="en-GB" sz="1000" dirty="0">
+                <a:latin typeface="Courier"/>
+              </a:rPr>
+              <a:t>  project.sh site deploy &lt;</a:t>
+            </a:r>
+            <a:r>
+              <a:rPr lang="en-GB" sz="1000" dirty="0" err="1">
+                <a:latin typeface="Courier"/>
+              </a:rPr>
+              <a:t>site_id</a:t>
+            </a:r>
+            <a:r>
+              <a:rPr lang="en-GB" sz="1000" dirty="0">
+                <a:latin typeface="Courier"/>
+              </a:rPr>
+              <a:t>&gt; -s &lt;step&gt; : create or install (if already exist) a web-site in the</a:t>
+            </a:r>
+          </a:p>
+          <a:p>
+            <a:pPr marL="0" indent="0">
               <a:buNone/>
             </a:pPr>
             <a:r>
-              <a:rPr lang="en-US" sz="3600" dirty="0">
-                <a:latin typeface="Courier New" pitchFamily="49" charset="0"/>
-                <a:cs typeface="Courier New" pitchFamily="49" charset="0"/>
-              </a:rPr>
-              <a:t>=====================================</a:t>
-            </a:r>
-          </a:p>
-          <a:p>
-            <a:pPr>
+              <a:rPr lang="en-GB" sz="1000" dirty="0">
+                <a:latin typeface="Courier"/>
+              </a:rPr>
+              <a:t>                                               project for development (</a:t>
+            </a:r>
+            <a:r>
+              <a:rPr lang="en-GB" sz="1000" dirty="0" err="1">
+                <a:latin typeface="Courier"/>
+              </a:rPr>
+              <a:t>drupal</a:t>
+            </a:r>
+            <a:r>
+              <a:rPr lang="en-GB" sz="1000" dirty="0">
+                <a:latin typeface="Courier"/>
+              </a:rPr>
+              <a:t> install)</a:t>
+            </a:r>
+          </a:p>
+          <a:p>
+            <a:pPr marL="0" indent="0">
               <a:buNone/>
             </a:pPr>
             <a:r>
-              <a:rPr lang="en-US" sz="3600" dirty="0">
-                <a:latin typeface="Courier New" pitchFamily="49" charset="0"/>
-                <a:cs typeface="Courier New" pitchFamily="49" charset="0"/>
-              </a:rPr>
-              <a:t> -h &lt;'url','url2','url3'&gt;                                 : list of all </a:t>
-            </a:r>
-            <a:r>
-              <a:rPr lang="en-US" sz="3600" dirty="0" err="1">
-                <a:latin typeface="Courier New" pitchFamily="49" charset="0"/>
-                <a:cs typeface="Courier New" pitchFamily="49" charset="0"/>
-              </a:rPr>
-              <a:t>urls</a:t>
-            </a:r>
-            <a:r>
-              <a:rPr lang="en-US" sz="3600" dirty="0">
-                <a:latin typeface="Courier New" pitchFamily="49" charset="0"/>
-                <a:cs typeface="Courier New" pitchFamily="49" charset="0"/>
-              </a:rPr>
-              <a:t> managed by this website between simple quote separated by </a:t>
-            </a:r>
-            <a:r>
-              <a:rPr lang="en-US" sz="3600" dirty="0" err="1">
-                <a:latin typeface="Courier New" pitchFamily="49" charset="0"/>
-                <a:cs typeface="Courier New" pitchFamily="49" charset="0"/>
-              </a:rPr>
-              <a:t>commat</a:t>
-            </a:r>
-            <a:endParaRPr lang="en-US" sz="3600" dirty="0">
-              <a:latin typeface="Courier New" pitchFamily="49" charset="0"/>
-              <a:cs typeface="Courier New" pitchFamily="49" charset="0"/>
+              <a:rPr lang="en-GB" sz="1000" dirty="0">
+                <a:latin typeface="Courier"/>
+              </a:rPr>
+              <a:t>                                             =&gt; you must set &lt;ID&gt;.config.local.ini and &lt;ID&gt;.config.global.ini before.</a:t>
+            </a:r>
+          </a:p>
+          <a:p>
+            <a:pPr marL="0" indent="0">
+              <a:buNone/>
+            </a:pPr>
+            <a:r>
+              <a:rPr lang="en-GB" sz="1000" dirty="0">
+                <a:latin typeface="Courier"/>
+              </a:rPr>
+              <a:t>  project.sh site remove &lt;site-id&gt;           : remove an web-site (installed or not)</a:t>
+            </a:r>
+          </a:p>
+          <a:p>
+            <a:pPr marL="0" indent="0">
+              <a:buNone/>
+            </a:pPr>
+            <a:r>
+              <a:rPr lang="en-GB" sz="1000" dirty="0">
+                <a:latin typeface="Courier"/>
+              </a:rPr>
+              <a:t>  project.sh site update &lt;site-id&gt;           : update and rebuild a web-site in production or dev</a:t>
+            </a:r>
+          </a:p>
+          <a:p>
+            <a:pPr marL="0" indent="0">
+              <a:buNone/>
+            </a:pPr>
+            <a:r>
+              <a:rPr lang="en-GB" sz="1000" dirty="0">
+                <a:latin typeface="Courier"/>
+              </a:rPr>
+              <a:t>  project.sh site back &lt;site-id&gt; [file]      : site configuration and data go back before the last snapshot.</a:t>
+            </a:r>
+          </a:p>
+          <a:p>
+            <a:pPr marL="0" indent="0">
+              <a:buNone/>
+            </a:pPr>
+            <a:r>
+              <a:rPr lang="en-GB" sz="1000" dirty="0">
+                <a:latin typeface="Courier"/>
+              </a:rPr>
+              <a:t>                                               if a file is specified, the script use that file as snapshot instead</a:t>
+            </a:r>
+          </a:p>
+          <a:p>
+            <a:pPr marL="0" indent="0">
+              <a:buNone/>
+            </a:pPr>
+            <a:r>
+              <a:rPr lang="en-GB" sz="1000" dirty="0">
+                <a:latin typeface="Courier"/>
+              </a:rPr>
+              <a:t> 			           of the last </a:t>
+            </a:r>
+            <a:r>
+              <a:rPr lang="en-GB" sz="1000" dirty="0" err="1">
+                <a:latin typeface="Courier"/>
+              </a:rPr>
+              <a:t>snapshot.The</a:t>
+            </a:r>
+            <a:r>
+              <a:rPr lang="en-GB" sz="1000" dirty="0">
+                <a:latin typeface="Courier"/>
+              </a:rPr>
+              <a:t> file must be in dump directory</a:t>
+            </a:r>
+          </a:p>
+          <a:p>
+            <a:pPr marL="0" indent="0">
+              <a:buNone/>
+            </a:pPr>
+            <a:r>
+              <a:rPr lang="en-GB" sz="1000" dirty="0">
+                <a:latin typeface="Courier"/>
+              </a:rPr>
+              <a:t>  project.sh site snapshot &lt;site-id&gt;         : make a snapshot (backup) of the site to go back to this point later</a:t>
+            </a:r>
+          </a:p>
+          <a:p>
+            <a:pPr marL="0" indent="0">
+              <a:buNone/>
+            </a:pPr>
+            <a:endParaRPr lang="en-GB" sz="1000" dirty="0">
+              <a:latin typeface="Courier"/>
             </a:endParaRPr>
           </a:p>
           <a:p>
-            <a:pPr>
+            <a:pPr marL="0" indent="0">
               <a:buNone/>
             </a:pPr>
             <a:r>
-              <a:rPr lang="nn-NO" sz="3600" dirty="0">
-                <a:latin typeface="Courier New" pitchFamily="49" charset="0"/>
-                <a:cs typeface="Courier New" pitchFamily="49" charset="0"/>
-              </a:rPr>
-              <a:t> -d &lt;mysql://db_user:db_password@db_host:db_port/db_name&gt; : database url</a:t>
-            </a:r>
-          </a:p>
-          <a:p>
-            <a:pPr>
+              <a:rPr lang="en-GB" sz="1000" dirty="0">
+                <a:latin typeface="Courier"/>
+              </a:rPr>
+              <a:t> = More help :</a:t>
+            </a:r>
+          </a:p>
+          <a:p>
+            <a:pPr marL="0" indent="0">
               <a:buNone/>
             </a:pPr>
             <a:r>
-              <a:rPr lang="en-US" sz="3600" dirty="0">
-                <a:latin typeface="Courier New" pitchFamily="49" charset="0"/>
-                <a:cs typeface="Courier New" pitchFamily="49" charset="0"/>
-              </a:rPr>
-              <a:t> -m (optional)                                            : activate the auto-login system DONT USE IT ON PRODUCTION SERVER</a:t>
-            </a:r>
-          </a:p>
-          <a:p>
-            <a:pPr>
+              <a:rPr lang="en-GB" sz="1000" dirty="0">
+                <a:latin typeface="Courier"/>
+              </a:rPr>
+              <a:t> =============</a:t>
+            </a:r>
+          </a:p>
+          <a:p>
+            <a:pPr marL="0" indent="0">
               <a:buNone/>
             </a:pPr>
             <a:r>
-              <a:rPr lang="en-US" sz="3600" dirty="0">
-                <a:latin typeface="Courier New" pitchFamily="49" charset="0"/>
-                <a:cs typeface="Courier New" pitchFamily="49" charset="0"/>
-              </a:rPr>
-              <a:t> -o &lt;user&gt;:&lt;group&gt; (optional)                             : apply '</a:t>
-            </a:r>
-            <a:r>
-              <a:rPr lang="en-US" sz="3600" dirty="0" err="1">
-                <a:latin typeface="Courier New" pitchFamily="49" charset="0"/>
-                <a:cs typeface="Courier New" pitchFamily="49" charset="0"/>
-              </a:rPr>
-              <a:t>chown</a:t>
-            </a:r>
-            <a:r>
-              <a:rPr lang="en-US" sz="3600" dirty="0">
-                <a:latin typeface="Courier New" pitchFamily="49" charset="0"/>
-                <a:cs typeface="Courier New" pitchFamily="49" charset="0"/>
-              </a:rPr>
-              <a:t> -R &lt;user&gt;:&lt;group&gt; *' on all directory created or modified by this script</a:t>
-            </a:r>
-          </a:p>
-          <a:p>
-            <a:pPr>
-              <a:buNone/>
-            </a:pPr>
-            <a:r>
-              <a:rPr lang="en-US" sz="3600" dirty="0">
-                <a:latin typeface="Courier New" pitchFamily="49" charset="0"/>
-                <a:cs typeface="Courier New" pitchFamily="49" charset="0"/>
-              </a:rPr>
-              <a:t> -e &lt;</a:t>
-            </a:r>
-            <a:r>
-              <a:rPr lang="en-US" sz="3600" dirty="0" err="1">
-                <a:latin typeface="Courier New" pitchFamily="49" charset="0"/>
-                <a:cs typeface="Courier New" pitchFamily="49" charset="0"/>
-              </a:rPr>
-              <a:t>environnement</a:t>
-            </a:r>
-            <a:r>
-              <a:rPr lang="en-US" sz="3600" dirty="0">
-                <a:latin typeface="Courier New" pitchFamily="49" charset="0"/>
-                <a:cs typeface="Courier New" pitchFamily="49" charset="0"/>
-              </a:rPr>
-              <a:t>&gt; (optional)                            : can by 'dev', '</a:t>
-            </a:r>
-            <a:r>
-              <a:rPr lang="en-US" sz="3600" dirty="0" err="1">
-                <a:latin typeface="Courier New" pitchFamily="49" charset="0"/>
-                <a:cs typeface="Courier New" pitchFamily="49" charset="0"/>
-              </a:rPr>
-              <a:t>rec</a:t>
-            </a:r>
-            <a:r>
-              <a:rPr lang="en-US" sz="3600" dirty="0">
-                <a:latin typeface="Courier New" pitchFamily="49" charset="0"/>
-                <a:cs typeface="Courier New" pitchFamily="49" charset="0"/>
-              </a:rPr>
-              <a:t>', '</a:t>
-            </a:r>
-            <a:r>
-              <a:rPr lang="en-US" sz="3600" dirty="0" err="1">
-                <a:latin typeface="Courier New" pitchFamily="49" charset="0"/>
-                <a:cs typeface="Courier New" pitchFamily="49" charset="0"/>
-              </a:rPr>
-              <a:t>int</a:t>
-            </a:r>
-            <a:r>
-              <a:rPr lang="en-US" sz="3600" dirty="0">
-                <a:latin typeface="Courier New" pitchFamily="49" charset="0"/>
-                <a:cs typeface="Courier New" pitchFamily="49" charset="0"/>
-              </a:rPr>
-              <a:t>', '</a:t>
-            </a:r>
-            <a:r>
-              <a:rPr lang="en-US" sz="3600" dirty="0" err="1">
-                <a:latin typeface="Courier New" pitchFamily="49" charset="0"/>
-                <a:cs typeface="Courier New" pitchFamily="49" charset="0"/>
-              </a:rPr>
-              <a:t>qual</a:t>
-            </a:r>
-            <a:r>
-              <a:rPr lang="en-US" sz="3600" dirty="0">
-                <a:latin typeface="Courier New" pitchFamily="49" charset="0"/>
-                <a:cs typeface="Courier New" pitchFamily="49" charset="0"/>
-              </a:rPr>
-              <a:t>', 'prod'. by default : 'prod'</a:t>
-            </a:r>
-          </a:p>
-          <a:p>
-            <a:pPr>
-              <a:buNone/>
-            </a:pPr>
-            <a:r>
-              <a:rPr lang="en-US" sz="3600" dirty="0">
-                <a:latin typeface="Courier New" pitchFamily="49" charset="0"/>
-                <a:cs typeface="Courier New" pitchFamily="49" charset="0"/>
-              </a:rPr>
-              <a:t> -a &lt;id&gt; (optional)                                       : specify an alternative </a:t>
-            </a:r>
-            <a:r>
-              <a:rPr lang="en-US" sz="3600" dirty="0" err="1">
-                <a:latin typeface="Courier New" pitchFamily="49" charset="0"/>
-                <a:cs typeface="Courier New" pitchFamily="49" charset="0"/>
-              </a:rPr>
-              <a:t>config</a:t>
-            </a:r>
-            <a:r>
-              <a:rPr lang="en-US" sz="3600" dirty="0">
-                <a:latin typeface="Courier New" pitchFamily="49" charset="0"/>
-                <a:cs typeface="Courier New" pitchFamily="49" charset="0"/>
-              </a:rPr>
-              <a:t> file in </a:t>
-            </a:r>
-            <a:r>
-              <a:rPr lang="en-US" sz="3600" dirty="0" err="1">
-                <a:latin typeface="Courier New" pitchFamily="49" charset="0"/>
-                <a:cs typeface="Courier New" pitchFamily="49" charset="0"/>
-              </a:rPr>
-              <a:t>config</a:t>
-            </a:r>
-            <a:r>
-              <a:rPr lang="en-US" sz="3600" dirty="0">
-                <a:latin typeface="Courier New" pitchFamily="49" charset="0"/>
-                <a:cs typeface="Courier New" pitchFamily="49" charset="0"/>
-              </a:rPr>
-              <a:t> directory like : site_&lt;site-ref&gt;&lt;id&gt;.conf</a:t>
-            </a:r>
-          </a:p>
-          <a:p>
-            <a:pPr>
-              <a:buNone/>
-            </a:pPr>
-            <a:r>
-              <a:rPr lang="en-US" sz="3600" dirty="0">
-                <a:latin typeface="Courier New" pitchFamily="49" charset="0"/>
-                <a:cs typeface="Courier New" pitchFamily="49" charset="0"/>
-              </a:rPr>
-              <a:t> -s [1|2|3] (optional)                                    : step by step. You can execute only the desired phase of deployment. FOR DEVELOPMENT OF THIS SCRIPT ONLY</a:t>
-            </a:r>
-          </a:p>
-          <a:p>
-            <a:pPr>
-              <a:buNone/>
-            </a:pPr>
-            <a:r>
-              <a:rPr lang="en-US" sz="3600" dirty="0">
-                <a:latin typeface="Courier New" pitchFamily="49" charset="0"/>
-                <a:cs typeface="Courier New" pitchFamily="49" charset="0"/>
-              </a:rPr>
-              <a:t>     phase 1 : creation of directories and settings file</a:t>
-            </a:r>
-          </a:p>
-          <a:p>
-            <a:pPr>
-              <a:buNone/>
-            </a:pPr>
-            <a:r>
-              <a:rPr lang="en-US" sz="3600" dirty="0">
-                <a:latin typeface="Courier New" pitchFamily="49" charset="0"/>
-                <a:cs typeface="Courier New" pitchFamily="49" charset="0"/>
-              </a:rPr>
-              <a:t>     phase 2 : drupal installation (drush)</a:t>
-            </a:r>
-          </a:p>
-          <a:p>
-            <a:pPr>
-              <a:buNone/>
-            </a:pPr>
-            <a:r>
-              <a:rPr lang="en-US" sz="3600" dirty="0">
-                <a:latin typeface="Courier New" pitchFamily="49" charset="0"/>
-                <a:cs typeface="Courier New" pitchFamily="49" charset="0"/>
-              </a:rPr>
-              <a:t>     phase 3 : cutting of settings.php file</a:t>
-            </a:r>
-          </a:p>
-          <a:p>
-            <a:pPr>
-              <a:buNone/>
-            </a:pPr>
-            <a:endParaRPr lang="en-US" sz="3600" dirty="0">
-              <a:latin typeface="Courier New" pitchFamily="49" charset="0"/>
-              <a:cs typeface="Courier New" pitchFamily="49" charset="0"/>
-            </a:endParaRPr>
-          </a:p>
-          <a:p>
-            <a:pPr>
-              <a:buNone/>
-            </a:pPr>
-            <a:endParaRPr lang="en-US" sz="3600" dirty="0">
-              <a:latin typeface="Courier New" pitchFamily="49" charset="0"/>
-              <a:cs typeface="Courier New" pitchFamily="49" charset="0"/>
-            </a:endParaRPr>
-          </a:p>
-          <a:p>
-            <a:pPr>
-              <a:buNone/>
-            </a:pPr>
-            <a:r>
-              <a:rPr lang="en-US" sz="3600" dirty="0">
-                <a:latin typeface="Courier New" pitchFamily="49" charset="0"/>
-                <a:cs typeface="Courier New" pitchFamily="49" charset="0"/>
-              </a:rPr>
-              <a:t>= Creation only options :</a:t>
-            </a:r>
-          </a:p>
-          <a:p>
-            <a:pPr>
-              <a:buNone/>
-            </a:pPr>
-            <a:r>
-              <a:rPr lang="en-US" sz="3600" dirty="0">
-                <a:latin typeface="Courier New" pitchFamily="49" charset="0"/>
-                <a:cs typeface="Courier New" pitchFamily="49" charset="0"/>
-              </a:rPr>
-              <a:t>=========================</a:t>
-            </a:r>
-          </a:p>
-          <a:p>
-            <a:pPr>
-              <a:buNone/>
-            </a:pPr>
-            <a:r>
-              <a:rPr lang="en-US" sz="3600" dirty="0">
-                <a:latin typeface="Courier New" pitchFamily="49" charset="0"/>
-                <a:cs typeface="Courier New" pitchFamily="49" charset="0"/>
-              </a:rPr>
-              <a:t> -x                                                       : mean 'internet site', else 'intranet site'</a:t>
-            </a:r>
-          </a:p>
-          <a:p>
-            <a:pPr>
-              <a:buNone/>
-            </a:pPr>
-            <a:endParaRPr lang="en-US" sz="3600" dirty="0">
-              <a:latin typeface="Courier New" pitchFamily="49" charset="0"/>
-              <a:cs typeface="Courier New" pitchFamily="49" charset="0"/>
-            </a:endParaRPr>
-          </a:p>
-          <a:p>
-            <a:pPr>
-              <a:buNone/>
-            </a:pPr>
-            <a:endParaRPr lang="en-US" sz="3600" dirty="0">
-              <a:latin typeface="Courier New" pitchFamily="49" charset="0"/>
-              <a:cs typeface="Courier New" pitchFamily="49" charset="0"/>
-            </a:endParaRPr>
-          </a:p>
-          <a:p>
-            <a:pPr>
-              <a:buNone/>
-            </a:pPr>
-            <a:r>
-              <a:rPr lang="en-US" sz="3600" dirty="0">
-                <a:latin typeface="Courier New" pitchFamily="49" charset="0"/>
-                <a:cs typeface="Courier New" pitchFamily="49" charset="0"/>
-              </a:rPr>
-              <a:t>= Using </a:t>
-            </a:r>
-            <a:r>
-              <a:rPr lang="en-US" sz="3600" dirty="0" err="1">
-                <a:latin typeface="Courier New" pitchFamily="49" charset="0"/>
-                <a:cs typeface="Courier New" pitchFamily="49" charset="0"/>
-              </a:rPr>
-              <a:t>ctm.conf</a:t>
-            </a:r>
-            <a:r>
-              <a:rPr lang="en-US" sz="3600" dirty="0">
-                <a:latin typeface="Courier New" pitchFamily="49" charset="0"/>
-                <a:cs typeface="Courier New" pitchFamily="49" charset="0"/>
-              </a:rPr>
-              <a:t> :</a:t>
-            </a:r>
-          </a:p>
-          <a:p>
-            <a:pPr>
-              <a:buNone/>
-            </a:pPr>
-            <a:r>
-              <a:rPr lang="en-US" sz="3600" dirty="0">
-                <a:latin typeface="Courier New" pitchFamily="49" charset="0"/>
-                <a:cs typeface="Courier New" pitchFamily="49" charset="0"/>
-              </a:rPr>
-              <a:t>==================</a:t>
-            </a:r>
-          </a:p>
-          <a:p>
-            <a:pPr>
-              <a:buNone/>
-            </a:pPr>
-            <a:r>
-              <a:rPr lang="en-US" sz="3600" dirty="0">
-                <a:latin typeface="Courier New" pitchFamily="49" charset="0"/>
-                <a:cs typeface="Courier New" pitchFamily="49" charset="0"/>
-              </a:rPr>
-              <a:t>You can use a configuration file with name "site_&lt;site-ref&gt;.conf" placed in the directory '</a:t>
-            </a:r>
-            <a:r>
-              <a:rPr lang="en-US" sz="3600" dirty="0" err="1">
-                <a:latin typeface="Courier New" pitchFamily="49" charset="0"/>
-                <a:cs typeface="Courier New" pitchFamily="49" charset="0"/>
-              </a:rPr>
-              <a:t>config</a:t>
-            </a:r>
-            <a:r>
-              <a:rPr lang="en-US" sz="3600" dirty="0">
-                <a:latin typeface="Courier New" pitchFamily="49" charset="0"/>
-                <a:cs typeface="Courier New" pitchFamily="49" charset="0"/>
-              </a:rPr>
-              <a:t>'. File </a:t>
-            </a:r>
-            <a:r>
-              <a:rPr lang="en-US" sz="3600" dirty="0" err="1">
-                <a:latin typeface="Courier New" pitchFamily="49" charset="0"/>
-                <a:cs typeface="Courier New" pitchFamily="49" charset="0"/>
-              </a:rPr>
-              <a:t>synthax</a:t>
-            </a:r>
-            <a:r>
-              <a:rPr lang="en-US" sz="3600" dirty="0">
-                <a:latin typeface="Courier New" pitchFamily="49" charset="0"/>
-                <a:cs typeface="Courier New" pitchFamily="49" charset="0"/>
-              </a:rPr>
-              <a:t> is :</a:t>
-            </a:r>
-          </a:p>
-          <a:p>
-            <a:pPr>
-              <a:buNone/>
-            </a:pPr>
-            <a:endParaRPr lang="en-US" sz="3600" dirty="0">
-              <a:latin typeface="Courier New" pitchFamily="49" charset="0"/>
-              <a:cs typeface="Courier New" pitchFamily="49" charset="0"/>
-            </a:endParaRPr>
-          </a:p>
-          <a:p>
-            <a:pPr>
-              <a:buNone/>
-            </a:pPr>
-            <a:r>
-              <a:rPr lang="en-US" sz="3600" dirty="0">
-                <a:latin typeface="Courier New" pitchFamily="49" charset="0"/>
-                <a:cs typeface="Courier New" pitchFamily="49" charset="0"/>
-              </a:rPr>
-              <a:t> HOSTNAME="'url','url2','url3'"</a:t>
-            </a:r>
-          </a:p>
-          <a:p>
-            <a:pPr>
-              <a:buNone/>
-            </a:pPr>
-            <a:r>
-              <a:rPr lang="en-US" sz="3600" dirty="0">
-                <a:latin typeface="Courier New" pitchFamily="49" charset="0"/>
-                <a:cs typeface="Courier New" pitchFamily="49" charset="0"/>
-              </a:rPr>
-              <a:t> MOCK=1</a:t>
-            </a:r>
-          </a:p>
-          <a:p>
-            <a:pPr>
-              <a:buNone/>
-            </a:pPr>
-            <a:r>
-              <a:rPr lang="en-US" sz="3600" dirty="0">
-                <a:latin typeface="Courier New" pitchFamily="49" charset="0"/>
-                <a:cs typeface="Courier New" pitchFamily="49" charset="0"/>
-              </a:rPr>
-              <a:t> DATABASE="mysql://db_user:db_password@db_host:db_port/db_name"</a:t>
-            </a:r>
-          </a:p>
-          <a:p>
-            <a:pPr>
-              <a:buNone/>
-            </a:pPr>
-            <a:r>
-              <a:rPr lang="en-US" sz="3600" dirty="0">
-                <a:latin typeface="Courier New" pitchFamily="49" charset="0"/>
-                <a:cs typeface="Courier New" pitchFamily="49" charset="0"/>
-              </a:rPr>
-              <a:t> CHOWN="</a:t>
-            </a:r>
-            <a:r>
-              <a:rPr lang="en-US" sz="3600" dirty="0" err="1">
-                <a:latin typeface="Courier New" pitchFamily="49" charset="0"/>
-                <a:cs typeface="Courier New" pitchFamily="49" charset="0"/>
-              </a:rPr>
-              <a:t>user:group</a:t>
-            </a:r>
-            <a:r>
-              <a:rPr lang="en-US" sz="3600" dirty="0">
-                <a:latin typeface="Courier New" pitchFamily="49" charset="0"/>
-                <a:cs typeface="Courier New" pitchFamily="49" charset="0"/>
-              </a:rPr>
-              <a:t>"</a:t>
-            </a:r>
-          </a:p>
-          <a:p>
-            <a:pPr>
-              <a:buNone/>
-            </a:pPr>
-            <a:r>
-              <a:rPr lang="en-US" sz="3600" dirty="0">
-                <a:latin typeface="Courier New" pitchFamily="49" charset="0"/>
-                <a:cs typeface="Courier New" pitchFamily="49" charset="0"/>
-              </a:rPr>
-              <a:t> ENVI="prod"</a:t>
-            </a:r>
-          </a:p>
-          <a:p>
-            <a:pPr>
-              <a:buNone/>
-            </a:pPr>
-            <a:endParaRPr lang="en-US" sz="3100" dirty="0">
-              <a:latin typeface="Courier New" pitchFamily="49" charset="0"/>
-              <a:cs typeface="Courier New" pitchFamily="49" charset="0"/>
-            </a:endParaRPr>
+              <a:rPr lang="en-GB" sz="1000" dirty="0">
+                <a:latin typeface="Courier"/>
+              </a:rPr>
+              <a:t>  Read install.md in "docs" directory for more information</a:t>
+            </a:r>
           </a:p>
         </p:txBody>
       </p:sp>
@@ -12292,16 +11785,22 @@
           <a:p>
             <a:pPr marL="747713" lvl="2" indent="-171450"/>
             <a:r>
+              <a:rPr lang="fr-FR" sz="2400" dirty="0" err="1">
+                <a:latin typeface="+mj-lt"/>
+              </a:rPr>
+              <a:t>Drush</a:t>
+            </a:r>
+            <a:r>
               <a:rPr lang="fr-FR" sz="2400" dirty="0">
                 <a:latin typeface="+mj-lt"/>
               </a:rPr>
-              <a:t>Drush </a:t>
+              <a:t> </a:t>
             </a:r>
             <a:r>
               <a:rPr lang="fr-FR" sz="2400" b="1" dirty="0" err="1">
                 <a:latin typeface="+mj-lt"/>
               </a:rPr>
-              <a:t>edg_queue</a:t>
+              <a:t>ctm_queue</a:t>
             </a:r>
             <a:endParaRPr lang="fr-FR" sz="2400" b="1" dirty="0">
               <a:latin typeface="+mj-lt"/>
@@ -12325,16 +11824,22 @@
           <a:p>
             <a:pPr marL="747713" lvl="2" indent="-171450"/>
             <a:r>
+              <a:rPr lang="fr-FR" sz="2400" dirty="0" err="1">
+                <a:latin typeface="+mj-lt"/>
+              </a:rPr>
+              <a:t>Drush</a:t>
+            </a:r>
+            <a:r>
               <a:rPr lang="fr-FR" sz="2400" dirty="0">
                 <a:latin typeface="+mj-lt"/>
               </a:rPr>
-              <a:t>Drush </a:t>
+              <a:t> </a:t>
             </a:r>
             <a:r>
               <a:rPr lang="fr-FR" sz="2400" b="1" dirty="0" err="1">
                 <a:latin typeface="+mj-lt"/>
               </a:rPr>
-              <a:t>edg_queue</a:t>
+              <a:t>ctm_queue</a:t>
             </a:r>
             <a:endParaRPr lang="fr-FR" sz="2400" b="1" dirty="0">
               <a:latin typeface="+mj-lt"/>
@@ -13913,7 +13418,7 @@
                 </a:solidFill>
                 <a:latin typeface="+mj-lt"/>
               </a:rPr>
-              <a:t> (TODO) (3 days)</a:t>
+              <a:t> (TODO)</a:t>
             </a:r>
           </a:p>
         </p:txBody>
@@ -14374,10 +13879,10 @@
           <a:lstStyle/>
           <a:p>
             <a:r>
-              <a:rPr lang="fr-FR" b="1" dirty="0" err="1">
-                <a:latin typeface="+mj-lt"/>
-              </a:rPr>
-              <a:t>Htdocs</a:t>
+              <a:rPr lang="fr-FR" b="1" dirty="0">
+                <a:latin typeface="+mj-lt"/>
+              </a:rPr>
+              <a:t>Web</a:t>
             </a:r>
             <a:r>
               <a:rPr lang="fr-FR" dirty="0">
@@ -14936,7 +14441,7 @@
                 </a:solidFill>
                 <a:latin typeface="+mj-lt"/>
               </a:rPr>
-              <a:t>(TODO) (2 days)</a:t>
+              <a:t>(TODO) </a:t>
             </a:r>
           </a:p>
           <a:p>
@@ -14950,8 +14455,17 @@
               <a:rPr lang="en-GB" sz="1400" dirty="0">
                 <a:latin typeface="+mj-lt"/>
               </a:rPr>
-              <a:t>CTM can generate static html pages that improve drastically performance. After generation, HTML pages can be provided without any call to drupal</a:t>
-            </a:r>
+              <a:t>CTM can generate static html pages that improve drastically performance. After generation, HTML pages can be provided without any call to </a:t>
+            </a:r>
+            <a:r>
+              <a:rPr lang="en-GB" sz="1400" dirty="0" err="1">
+                <a:latin typeface="+mj-lt"/>
+              </a:rPr>
+              <a:t>drupal</a:t>
+            </a:r>
+            <a:endParaRPr lang="en-GB" sz="1400" dirty="0">
+              <a:latin typeface="+mj-lt"/>
+            </a:endParaRPr>
           </a:p>
           <a:p>
             <a:pPr lvl="1">
@@ -15002,7 +14516,7 @@
                 </a:solidFill>
                 <a:latin typeface="+mj-lt"/>
               </a:rPr>
-              <a:t>(TODO) (3 days)</a:t>
+              <a:t>(TODO) </a:t>
             </a:r>
           </a:p>
           <a:p>
@@ -15054,7 +14568,7 @@
                 </a:solidFill>
                 <a:latin typeface="+mj-lt"/>
               </a:rPr>
-              <a:t>(TODO) (need infrastructure)</a:t>
+              <a:t>(TODO) </a:t>
             </a:r>
           </a:p>
           <a:p>
@@ -15247,7 +14761,7 @@
                 </a:solidFill>
                 <a:latin typeface="+mj-lt"/>
               </a:rPr>
-              <a:t>(TODO 3 days)</a:t>
+              <a:t>(TODO )</a:t>
             </a:r>
           </a:p>
           <a:p>
@@ -15269,7 +14783,7 @@
                 </a:solidFill>
                 <a:latin typeface="+mj-lt"/>
               </a:rPr>
-              <a:t>(TODO 3 days)</a:t>
+              <a:t>(TODO )</a:t>
             </a:r>
           </a:p>
           <a:p>
@@ -15343,7 +14857,7 @@
               <a:rPr lang="en-GB" sz="1600" dirty="0">
                 <a:latin typeface="+mj-lt"/>
               </a:rPr>
-              <a:t>Integration of bigger functionalities from the other versions (feeds extension (0,5j), </a:t>
+              <a:t>Integration of bigger functionalities from the other versions (feeds extension, </a:t>
             </a:r>
             <a:r>
               <a:rPr lang="en-GB" sz="1600" dirty="0" err="1">
@@ -15355,7 +14869,7 @@
               <a:rPr lang="en-GB" sz="1600" dirty="0">
                 <a:latin typeface="+mj-lt"/>
               </a:rPr>
-              <a:t> (15j))</a:t>
+              <a:t>)</a:t>
             </a:r>
           </a:p>
           <a:p>
@@ -15389,7 +14903,7 @@
                 </a:solidFill>
                 <a:latin typeface="+mj-lt"/>
               </a:rPr>
-              <a:t>(TODO 3 days)</a:t>
+              <a:t>(TODO)</a:t>
             </a:r>
           </a:p>
           <a:p>
@@ -15411,7 +14925,7 @@
                 </a:solidFill>
                 <a:latin typeface="+mj-lt"/>
               </a:rPr>
-              <a:t>(TODO) (?)</a:t>
+              <a:t>(TODO)</a:t>
             </a:r>
           </a:p>
           <a:p>
@@ -20965,6 +20479,14 @@
           </a:p>
           <a:p>
             <a:r>
+              <a:rPr lang="en-GB" sz="1400" dirty="0">
+                <a:latin typeface="+mj-lt"/>
+              </a:rPr>
+              <a:t>Cross join</a:t>
+            </a:r>
+          </a:p>
+          <a:p>
+            <a:r>
               <a:rPr lang="en-GB" sz="1400" dirty="0" err="1">
                 <a:latin typeface="+mj-lt"/>
               </a:rPr>
@@ -21521,6 +21043,14 @@
                 <a:latin typeface="+mj-lt"/>
               </a:rPr>
               <a:t>Views bulk operations</a:t>
+            </a:r>
+          </a:p>
+          <a:p>
+            <a:r>
+              <a:rPr lang="en-GB" sz="1400" dirty="0">
+                <a:latin typeface="+mj-lt"/>
+              </a:rPr>
+              <a:t>Views merge rows</a:t>
             </a:r>
           </a:p>
           <a:p>

</xml_diff>